<commit_message>
figure corrections in lex slides
</commit_message>
<xml_diff>
--- a/assets/ppt/lex/lex4-regexps-as-automata.pptx
+++ b/assets/ppt/lex/lex4-regexps-as-automata.pptx
@@ -20235,7 +20235,7 @@
               <a:buChar char="•"/>
             </a:pPr>
             <a:r>
-              <a:rPr lang="en-US" sz="3200" b="0" i="0" u="none" strike="noStrike" cap="none">
+              <a:rPr lang="en-US" sz="3200" b="0" i="0" u="none" strike="noStrike" cap="none" dirty="0">
                 <a:solidFill>
                   <a:schemeClr val="dk1"/>
                 </a:solidFill>
@@ -20262,7 +20262,7 @@
               <a:buFont typeface="Calibri"/>
               <a:buNone/>
             </a:pPr>
-            <a:endParaRPr sz="3200" b="0" i="0" u="none" strike="noStrike" cap="none">
+            <a:endParaRPr sz="3200" b="0" i="0" u="none" strike="noStrike" cap="none" dirty="0">
               <a:solidFill>
                 <a:schemeClr val="dk1"/>
               </a:solidFill>
@@ -20287,7 +20287,7 @@
               <a:buFont typeface="Calibri"/>
               <a:buNone/>
             </a:pPr>
-            <a:endParaRPr sz="3200" b="0" i="0" u="none" strike="noStrike" cap="none">
+            <a:endParaRPr sz="3200" b="0" i="0" u="none" strike="noStrike" cap="none" dirty="0">
               <a:solidFill>
                 <a:schemeClr val="dk1"/>
               </a:solidFill>
@@ -20313,7 +20313,7 @@
               <a:buChar char="•"/>
             </a:pPr>
             <a:r>
-              <a:rPr lang="en-US" sz="3200" b="0" i="0" u="none" strike="noStrike" cap="none">
+              <a:rPr lang="en-US" sz="3200" b="0" i="0" u="none" strike="noStrike" cap="none" dirty="0">
                 <a:solidFill>
                   <a:schemeClr val="dk1"/>
                 </a:solidFill>
@@ -20322,7 +20322,31 @@
                 <a:cs typeface="Calibri"/>
                 <a:sym typeface="Calibri"/>
               </a:rPr>
-              <a:t>Can have ε-moves</a:t>
+              <a:t>Can have </a:t>
+            </a:r>
+            <a:r>
+              <a:rPr lang="en-US" sz="3200" b="0" i="0" u="none" strike="noStrike" cap="none" dirty="0" err="1">
+                <a:solidFill>
+                  <a:schemeClr val="dk1"/>
+                </a:solidFill>
+                <a:latin typeface="Calibri"/>
+                <a:ea typeface="Calibri"/>
+                <a:cs typeface="Calibri"/>
+                <a:sym typeface="Calibri"/>
+              </a:rPr>
+              <a:t>ε</a:t>
+            </a:r>
+            <a:r>
+              <a:rPr lang="en-US" sz="3200" b="0" i="0" u="none" strike="noStrike" cap="none" dirty="0">
+                <a:solidFill>
+                  <a:schemeClr val="dk1"/>
+                </a:solidFill>
+                <a:latin typeface="Calibri"/>
+                <a:ea typeface="Calibri"/>
+                <a:cs typeface="Calibri"/>
+                <a:sym typeface="Calibri"/>
+              </a:rPr>
+              <a:t>-moves</a:t>
             </a:r>
           </a:p>
         </p:txBody>
@@ -20479,7 +20503,7 @@
             <a:solidFill>
               <a:srgbClr val="FF9900"/>
             </a:solidFill>
-            <a:ln w="28575" cap="flat" cmpd="sng">
+            <a:ln w="12700" cap="flat" cmpd="sng">
               <a:solidFill>
                 <a:schemeClr val="dk1"/>
               </a:solidFill>
@@ -20506,7 +20530,7 @@
                 <a:buNone/>
               </a:pPr>
               <a:r>
-                <a:rPr lang="en-US" sz="2400">
+                <a:rPr lang="en-US" sz="2400" dirty="0">
                   <a:solidFill>
                     <a:schemeClr val="dk1"/>
                   </a:solidFill>
@@ -20537,7 +20561,7 @@
             <a:solidFill>
               <a:srgbClr val="FF9900"/>
             </a:solidFill>
-            <a:ln w="28575" cap="flat" cmpd="sng">
+            <a:ln w="12700" cap="flat" cmpd="sng">
               <a:solidFill>
                 <a:schemeClr val="dk1"/>
               </a:solidFill>
@@ -20845,7 +20869,7 @@
             <a:solidFill>
               <a:srgbClr val="FF9900"/>
             </a:solidFill>
-            <a:ln w="28575" cap="flat" cmpd="sng">
+            <a:ln w="12700" cap="flat" cmpd="sng">
               <a:solidFill>
                 <a:schemeClr val="dk1"/>
               </a:solidFill>
@@ -20899,7 +20923,7 @@
             <a:solidFill>
               <a:srgbClr val="FF9900"/>
             </a:solidFill>
-            <a:ln w="28575" cap="flat" cmpd="sng">
+            <a:ln w="12700" cap="flat" cmpd="sng">
               <a:solidFill>
                 <a:schemeClr val="dk1"/>
               </a:solidFill>
@@ -21130,7 +21154,7 @@
             <a:solidFill>
               <a:srgbClr val="FF9900"/>
             </a:solidFill>
-            <a:ln w="28575" cap="flat" cmpd="sng">
+            <a:ln w="12700" cap="flat" cmpd="sng">
               <a:solidFill>
                 <a:schemeClr val="dk1"/>
               </a:solidFill>
@@ -21188,7 +21212,7 @@
             <a:solidFill>
               <a:srgbClr val="FF9900"/>
             </a:solidFill>
-            <a:ln w="28575" cap="flat" cmpd="sng">
+            <a:ln w="12700" cap="flat" cmpd="sng">
               <a:solidFill>
                 <a:schemeClr val="dk1"/>
               </a:solidFill>
@@ -21778,7 +21802,7 @@
             <a:solidFill>
               <a:srgbClr val="FF9900"/>
             </a:solidFill>
-            <a:ln w="28575" cap="flat" cmpd="sng">
+            <a:ln w="12700" cap="flat" cmpd="sng">
               <a:solidFill>
                 <a:schemeClr val="dk1"/>
               </a:solidFill>
@@ -21805,7 +21829,7 @@
                 <a:buNone/>
               </a:pPr>
               <a:r>
-                <a:rPr lang="en-US" sz="2400">
+                <a:rPr lang="en-US" sz="2400" dirty="0">
                   <a:solidFill>
                     <a:schemeClr val="dk1"/>
                   </a:solidFill>
@@ -21925,7 +21949,7 @@
             <a:solidFill>
               <a:srgbClr val="FF9900"/>
             </a:solidFill>
-            <a:ln w="28575" cap="flat" cmpd="sng">
+            <a:ln w="12700" cap="flat" cmpd="sng">
               <a:solidFill>
                 <a:schemeClr val="dk1"/>
               </a:solidFill>
@@ -22072,7 +22096,7 @@
             <a:solidFill>
               <a:srgbClr val="FF9900"/>
             </a:solidFill>
-            <a:ln w="28575" cap="flat" cmpd="sng">
+            <a:ln w="12700" cap="flat" cmpd="sng">
               <a:solidFill>
                 <a:schemeClr val="dk1"/>
               </a:solidFill>
@@ -22288,7 +22312,7 @@
             <a:solidFill>
               <a:srgbClr val="FF9900"/>
             </a:solidFill>
-            <a:ln w="28575" cap="flat" cmpd="sng">
+            <a:ln w="12700" cap="flat" cmpd="sng">
               <a:solidFill>
                 <a:schemeClr val="dk1"/>
               </a:solidFill>
@@ -22342,7 +22366,7 @@
             <a:solidFill>
               <a:srgbClr val="FF9900"/>
             </a:solidFill>
-            <a:ln w="28575" cap="flat" cmpd="sng">
+            <a:ln w="12700" cap="flat" cmpd="sng">
               <a:solidFill>
                 <a:schemeClr val="dk1"/>
               </a:solidFill>
@@ -22399,7 +22423,7 @@
             <a:solidFill>
               <a:schemeClr val="accent1"/>
             </a:solidFill>
-            <a:ln w="28575" cap="flat" cmpd="sng">
+            <a:ln w="12700" cap="flat" cmpd="sng">
               <a:solidFill>
                 <a:schemeClr val="dk1"/>
               </a:solidFill>
@@ -22430,7 +22454,7 @@
             <a:solidFill>
               <a:schemeClr val="accent1"/>
             </a:solidFill>
-            <a:ln w="28575" cap="flat" cmpd="sng">
+            <a:ln w="12700" cap="flat" cmpd="sng">
               <a:solidFill>
                 <a:schemeClr val="dk1"/>
               </a:solidFill>
@@ -22456,7 +22480,7 @@
               <a:avLst/>
             </a:prstGeom>
             <a:noFill/>
-            <a:ln w="28575" cap="flat" cmpd="sng">
+            <a:ln w="12700" cap="flat" cmpd="sng">
               <a:solidFill>
                 <a:srgbClr val="000000">
                   <a:alpha val="0"/>
@@ -22516,7 +22540,7 @@
             <a:solidFill>
               <a:srgbClr val="FF9900"/>
             </a:solidFill>
-            <a:ln w="28575" cap="flat" cmpd="sng">
+            <a:ln w="12700" cap="flat" cmpd="sng">
               <a:solidFill>
                 <a:schemeClr val="dk1"/>
               </a:solidFill>
@@ -22570,7 +22594,7 @@
             <a:solidFill>
               <a:srgbClr val="FF9900"/>
             </a:solidFill>
-            <a:ln w="28575" cap="flat" cmpd="sng">
+            <a:ln w="12700" cap="flat" cmpd="sng">
               <a:solidFill>
                 <a:schemeClr val="dk1"/>
               </a:solidFill>
@@ -22627,7 +22651,7 @@
             <a:solidFill>
               <a:schemeClr val="accent1"/>
             </a:solidFill>
-            <a:ln w="28575" cap="flat" cmpd="sng">
+            <a:ln w="12700" cap="flat" cmpd="sng">
               <a:solidFill>
                 <a:schemeClr val="dk1"/>
               </a:solidFill>
@@ -22658,7 +22682,7 @@
             <a:solidFill>
               <a:schemeClr val="accent1"/>
             </a:solidFill>
-            <a:ln w="28575" cap="flat" cmpd="sng">
+            <a:ln w="12700" cap="flat" cmpd="sng">
               <a:solidFill>
                 <a:schemeClr val="dk1"/>
               </a:solidFill>
@@ -22684,7 +22708,7 @@
               <a:avLst/>
             </a:prstGeom>
             <a:noFill/>
-            <a:ln w="28575" cap="flat" cmpd="sng">
+            <a:ln w="12700" cap="flat" cmpd="sng">
               <a:solidFill>
                 <a:srgbClr val="000000">
                   <a:alpha val="0"/>
@@ -22744,7 +22768,7 @@
             <a:solidFill>
               <a:srgbClr val="FF9900"/>
             </a:solidFill>
-            <a:ln w="28575" cap="flat" cmpd="sng">
+            <a:ln w="12700" cap="flat" cmpd="sng">
               <a:solidFill>
                 <a:schemeClr val="dk1"/>
               </a:solidFill>
@@ -22801,7 +22825,7 @@
             <a:solidFill>
               <a:schemeClr val="accent1"/>
             </a:solidFill>
-            <a:ln w="28575" cap="flat" cmpd="sng">
+            <a:ln w="12700" cap="flat" cmpd="sng">
               <a:solidFill>
                 <a:schemeClr val="dk1"/>
               </a:solidFill>
@@ -22827,7 +22851,7 @@
               <a:avLst/>
             </a:prstGeom>
             <a:noFill/>
-            <a:ln w="28575" cap="flat" cmpd="sng">
+            <a:ln w="12700" cap="flat" cmpd="sng">
               <a:solidFill>
                 <a:srgbClr val="000000">
                   <a:alpha val="0"/>
@@ -22889,7 +22913,7 @@
             <a:solidFill>
               <a:schemeClr val="accent1"/>
             </a:solidFill>
-            <a:ln w="28575" cap="flat" cmpd="sng">
+            <a:ln w="12700" cap="flat" cmpd="sng">
               <a:solidFill>
                 <a:schemeClr val="dk1"/>
               </a:solidFill>
@@ -22917,7 +22941,7 @@
             <a:solidFill>
               <a:srgbClr val="FF9900"/>
             </a:solidFill>
-            <a:ln w="28575" cap="flat" cmpd="sng">
+            <a:ln w="12700" cap="flat" cmpd="sng">
               <a:solidFill>
                 <a:schemeClr val="dk1"/>
               </a:solidFill>
@@ -22974,7 +22998,7 @@
             <a:solidFill>
               <a:schemeClr val="accent1"/>
             </a:solidFill>
-            <a:ln w="28575" cap="flat" cmpd="sng">
+            <a:ln w="12700" cap="flat" cmpd="sng">
               <a:solidFill>
                 <a:schemeClr val="dk1"/>
               </a:solidFill>
@@ -23005,7 +23029,7 @@
             <a:solidFill>
               <a:schemeClr val="accent1"/>
             </a:solidFill>
-            <a:ln w="28575" cap="flat" cmpd="sng">
+            <a:ln w="12700" cap="flat" cmpd="sng">
               <a:solidFill>
                 <a:schemeClr val="dk1"/>
               </a:solidFill>
@@ -23035,7 +23059,7 @@
             <a:solidFill>
               <a:schemeClr val="accent1"/>
             </a:solidFill>
-            <a:ln w="28575" cap="flat" cmpd="sng">
+            <a:ln w="12700" cap="flat" cmpd="sng">
               <a:solidFill>
                 <a:schemeClr val="dk1"/>
               </a:solidFill>
@@ -23065,7 +23089,7 @@
             <a:solidFill>
               <a:schemeClr val="accent1"/>
             </a:solidFill>
-            <a:ln w="28575" cap="flat" cmpd="sng">
+            <a:ln w="12700" cap="flat" cmpd="sng">
               <a:solidFill>
                 <a:schemeClr val="dk1"/>
               </a:solidFill>
@@ -23095,7 +23119,7 @@
             <a:solidFill>
               <a:schemeClr val="accent1"/>
             </a:solidFill>
-            <a:ln w="28575" cap="flat" cmpd="sng">
+            <a:ln w="12700" cap="flat" cmpd="sng">
               <a:solidFill>
                 <a:schemeClr val="dk1"/>
               </a:solidFill>
@@ -23126,7 +23150,7 @@
             <a:solidFill>
               <a:schemeClr val="accent1"/>
             </a:solidFill>
-            <a:ln w="28575" cap="flat" cmpd="sng">
+            <a:ln w="12700" cap="flat" cmpd="sng">
               <a:solidFill>
                 <a:schemeClr val="dk1"/>
               </a:solidFill>
@@ -23154,7 +23178,7 @@
             <a:solidFill>
               <a:srgbClr val="FF9900"/>
             </a:solidFill>
-            <a:ln w="28575" cap="flat" cmpd="dbl">
+            <a:ln w="12700" cap="flat" cmpd="dbl">
               <a:solidFill>
                 <a:schemeClr val="dk1"/>
               </a:solidFill>
@@ -23210,7 +23234,7 @@
             <a:solidFill>
               <a:schemeClr val="accent1"/>
             </a:solidFill>
-            <a:ln w="28575" cap="flat" cmpd="sng">
+            <a:ln w="12700" cap="flat" cmpd="sng">
               <a:solidFill>
                 <a:schemeClr val="dk1"/>
               </a:solidFill>
@@ -23238,7 +23262,7 @@
             <a:solidFill>
               <a:srgbClr val="FF9900"/>
             </a:solidFill>
-            <a:ln w="28575" cap="flat" cmpd="sng">
+            <a:ln w="12700" cap="flat" cmpd="sng">
               <a:solidFill>
                 <a:schemeClr val="dk1"/>
               </a:solidFill>
@@ -23292,7 +23316,7 @@
             <a:solidFill>
               <a:srgbClr val="FF9900"/>
             </a:solidFill>
-            <a:ln w="28575" cap="flat" cmpd="sng">
+            <a:ln w="12700" cap="flat" cmpd="sng">
               <a:solidFill>
                 <a:schemeClr val="dk1"/>
               </a:solidFill>
@@ -23349,7 +23373,7 @@
             <a:solidFill>
               <a:schemeClr val="accent1"/>
             </a:solidFill>
-            <a:ln w="28575" cap="flat" cmpd="sng">
+            <a:ln w="12700" cap="flat" cmpd="sng">
               <a:solidFill>
                 <a:schemeClr val="dk1"/>
               </a:solidFill>
@@ -23650,7 +23674,7 @@
             <a:solidFill>
               <a:srgbClr val="FF9900"/>
             </a:solidFill>
-            <a:ln w="28575" cap="flat" cmpd="sng">
+            <a:ln w="12700" cap="flat" cmpd="sng">
               <a:solidFill>
                 <a:schemeClr val="dk1"/>
               </a:solidFill>
@@ -32004,7 +32028,7 @@
           <a:solidFill>
             <a:srgbClr val="FF9900"/>
           </a:solidFill>
-          <a:ln w="9525" cap="flat" cmpd="sng">
+          <a:ln w="28575" cap="flat" cmpd="sng">
             <a:solidFill>
               <a:schemeClr val="dk1"/>
             </a:solidFill>
@@ -32973,7 +32997,7 @@
               <a:buChar char="•"/>
             </a:pPr>
             <a:r>
-              <a:rPr lang="en-US" sz="3200" b="0" i="0" u="none" strike="noStrike" cap="none">
+              <a:rPr lang="en-US" sz="3200" b="0" i="0" u="none" strike="noStrike" cap="none" dirty="0">
                 <a:solidFill>
                   <a:schemeClr val="dk1"/>
                 </a:solidFill>
@@ -33000,7 +33024,7 @@
               <a:buFont typeface="Calibri"/>
               <a:buNone/>
             </a:pPr>
-            <a:endParaRPr sz="3200" b="0" i="0" u="none" strike="noStrike" cap="none">
+            <a:endParaRPr sz="3200" b="0" i="0" u="none" strike="noStrike" cap="none" dirty="0">
               <a:solidFill>
                 <a:schemeClr val="dk1"/>
               </a:solidFill>
@@ -33025,7 +33049,7 @@
               <a:buFont typeface="Calibri"/>
               <a:buNone/>
             </a:pPr>
-            <a:endParaRPr sz="3200" b="0" i="0" u="none" strike="noStrike" cap="none">
+            <a:endParaRPr sz="3200" b="0" i="0" u="none" strike="noStrike" cap="none" dirty="0">
               <a:solidFill>
                 <a:schemeClr val="dk1"/>
               </a:solidFill>
@@ -33050,7 +33074,7 @@
               <a:buFont typeface="Calibri"/>
               <a:buNone/>
             </a:pPr>
-            <a:endParaRPr sz="3200" b="0" i="0" u="none" strike="noStrike" cap="none">
+            <a:endParaRPr sz="3200" b="0" i="0" u="none" strike="noStrike" cap="none" dirty="0">
               <a:solidFill>
                 <a:schemeClr val="dk1"/>
               </a:solidFill>
@@ -33076,7 +33100,7 @@
               <a:buChar char="•"/>
             </a:pPr>
             <a:r>
-              <a:rPr lang="en-US" sz="3200" b="0" i="0" u="none" strike="noStrike" cap="none">
+              <a:rPr lang="en-US" sz="3200" b="0" i="0" u="none" strike="noStrike" cap="none" dirty="0">
                 <a:solidFill>
                   <a:schemeClr val="dk1"/>
                 </a:solidFill>
@@ -33085,7 +33109,31 @@
                 <a:cs typeface="Calibri"/>
                 <a:sym typeface="Calibri"/>
               </a:rPr>
-              <a:t>No ε-moves</a:t>
+              <a:t>No </a:t>
+            </a:r>
+            <a:r>
+              <a:rPr lang="en-US" sz="3200" b="0" i="0" u="none" strike="noStrike" cap="none" dirty="0" err="1">
+                <a:solidFill>
+                  <a:schemeClr val="dk1"/>
+                </a:solidFill>
+                <a:latin typeface="Calibri"/>
+                <a:ea typeface="Calibri"/>
+                <a:cs typeface="Calibri"/>
+                <a:sym typeface="Calibri"/>
+              </a:rPr>
+              <a:t>ε</a:t>
+            </a:r>
+            <a:r>
+              <a:rPr lang="en-US" sz="3200" b="0" i="0" u="none" strike="noStrike" cap="none" dirty="0">
+                <a:solidFill>
+                  <a:schemeClr val="dk1"/>
+                </a:solidFill>
+                <a:latin typeface="Calibri"/>
+                <a:ea typeface="Calibri"/>
+                <a:cs typeface="Calibri"/>
+                <a:sym typeface="Calibri"/>
+              </a:rPr>
+              <a:t>-moves</a:t>
             </a:r>
           </a:p>
           <a:p>
@@ -33103,7 +33151,7 @@
               <a:buFont typeface="Calibri"/>
               <a:buNone/>
             </a:pPr>
-            <a:endParaRPr sz="3200" b="0" i="0" u="none" strike="noStrike" cap="none">
+            <a:endParaRPr sz="3200" b="0" i="0" u="none" strike="noStrike" cap="none" dirty="0">
               <a:solidFill>
                 <a:schemeClr val="dk1"/>
               </a:solidFill>
@@ -33267,9 +33315,9 @@
             <a:solidFill>
               <a:srgbClr val="FF9900"/>
             </a:solidFill>
-            <a:ln w="28575" cap="flat" cmpd="sng">
+            <a:ln w="12700" cap="flat" cmpd="sng">
               <a:solidFill>
-                <a:schemeClr val="dk1"/>
+                <a:schemeClr val="tx1"/>
               </a:solidFill>
               <a:prstDash val="solid"/>
               <a:round/>
@@ -33325,7 +33373,7 @@
             <a:solidFill>
               <a:srgbClr val="FF9900"/>
             </a:solidFill>
-            <a:ln w="28575" cap="flat" cmpd="sng">
+            <a:ln w="12700" cap="flat" cmpd="sng">
               <a:solidFill>
                 <a:schemeClr val="dk1"/>
               </a:solidFill>

</xml_diff>

<commit_message>
clean up lex4 slides
</commit_message>
<xml_diff>
--- a/assets/ppt/lex/lex4-regexps-as-automata.pptx
+++ b/assets/ppt/lex/lex4-regexps-as-automata.pptx
@@ -26059,8 +26059,8 @@
             <a:chExt cx="3436715" cy="461664"/>
           </a:xfrm>
         </p:grpSpPr>
-        <mc:AlternateContent xmlns:mc="http://schemas.openxmlformats.org/markup-compatibility/2006">
-          <mc:Choice xmlns:a14="http://schemas.microsoft.com/office/drawing/2010/main" Requires="a14">
+        <mc:AlternateContent xmlns:mc="http://schemas.openxmlformats.org/markup-compatibility/2006" xmlns:a14="http://schemas.microsoft.com/office/drawing/2010/main">
+          <mc:Choice Requires="a14">
             <p:sp>
               <p:nvSpPr>
                 <p:cNvPr id="451" name="Shape 451"/>
@@ -26140,7 +26140,7 @@
               </p:txBody>
             </p:sp>
           </mc:Choice>
-          <mc:Fallback>
+          <mc:Fallback xmlns="">
             <p:sp>
               <p:nvSpPr>
                 <p:cNvPr id="451" name="Shape 451"/>
@@ -29972,7 +29972,7 @@
                   <a:cs typeface="Calibri"/>
                   <a:sym typeface="Calibri"/>
                 </a:rPr>
-                <a:t>X</a:t>
+                <a:t> </a:t>
               </a:r>
             </a:p>
           </p:txBody>
@@ -30036,7 +30036,7 @@
                   <a:cs typeface="Calibri"/>
                   <a:sym typeface="Calibri"/>
                 </a:rPr>
-                <a:t>Y</a:t>
+                <a:t> </a:t>
               </a:r>
             </a:p>
           </p:txBody>
@@ -30100,7 +30100,7 @@
                   <a:cs typeface="Calibri"/>
                   <a:sym typeface="Calibri"/>
                 </a:rPr>
-                <a:t>Z</a:t>
+                <a:t> </a:t>
               </a:r>
             </a:p>
           </p:txBody>

</xml_diff>

<commit_message>
modified defn of "char" and "char_lit"
</commit_message>
<xml_diff>
--- a/assets/ppt/lex/lex4-regexps-as-automata.pptx
+++ b/assets/ppt/lex/lex4-regexps-as-automata.pptx
@@ -27650,7 +27650,7 @@
                 <a:cs typeface="Calibri"/>
                 <a:sym typeface="Calibri"/>
               </a:rPr>
-              <a:t>1</a:t>
+              <a:t>0</a:t>
             </a:r>
           </a:p>
         </p:txBody>
@@ -27669,8 +27669,8 @@
         </p:nvSpPr>
         <p:spPr>
           <a:xfrm>
-            <a:off x="2016343" y="6096309"/>
-            <a:ext cx="340800" cy="461700"/>
+            <a:off x="2031834" y="6096309"/>
+            <a:ext cx="309818" cy="461700"/>
           </a:xfrm>
           <a:prstGeom prst="rect">
             <a:avLst/>
@@ -27714,7 +27714,7 @@
                 <a:cs typeface="Calibri"/>
                 <a:sym typeface="Calibri"/>
               </a:rPr>
-              <a:t>0</a:t>
+              <a:t>1</a:t>
             </a:r>
           </a:p>
         </p:txBody>
@@ -29568,8 +29568,8 @@
         </p:nvSpPr>
         <p:spPr>
           <a:xfrm>
-            <a:off x="6330567" y="2354513"/>
-            <a:ext cx="340658" cy="461664"/>
+            <a:off x="6313534" y="2391089"/>
+            <a:ext cx="374724" cy="461664"/>
           </a:xfrm>
           <a:prstGeom prst="rect">
             <a:avLst/>
@@ -29613,7 +29613,7 @@
                 <a:cs typeface="Calibri"/>
                 <a:sym typeface="Calibri"/>
               </a:rPr>
-              <a:t>1</a:t>
+              <a:t>0</a:t>
             </a:r>
           </a:p>
         </p:txBody>
@@ -29632,8 +29632,8 @@
         </p:nvSpPr>
         <p:spPr>
           <a:xfrm>
-            <a:off x="4232601" y="3591092"/>
-            <a:ext cx="340800" cy="461700"/>
+            <a:off x="4248092" y="3591092"/>
+            <a:ext cx="309818" cy="461700"/>
           </a:xfrm>
           <a:prstGeom prst="rect">
             <a:avLst/>
@@ -29677,7 +29677,7 @@
                 <a:cs typeface="Calibri"/>
                 <a:sym typeface="Calibri"/>
               </a:rPr>
-              <a:t>0</a:t>
+              <a:t>1</a:t>
             </a:r>
           </a:p>
         </p:txBody>

</xml_diff>